<commit_message>
Updates for 2023 version of talk
</commit_message>
<xml_diff>
--- a/img/img_files/people.pptx
+++ b/img/img_files/people.pptx
@@ -8,6 +8,7 @@
     <p:sldId id="256" r:id="rId2"/>
     <p:sldId id="257" r:id="rId3"/>
     <p:sldId id="258" r:id="rId4"/>
+    <p:sldId id="259" r:id="rId5"/>
   </p:sldIdLst>
   <p:sldSz cx="12192000" cy="6858000"/>
   <p:notesSz cx="6858000" cy="9144000"/>
@@ -128,13 +129,93 @@
 <file path=ppt/revisionInfo.xml><?xml version="1.0" encoding="utf-8"?>
 <p1510:revInfo xmlns:a="http://schemas.openxmlformats.org/drawingml/2006/main" xmlns:r="http://schemas.openxmlformats.org/officeDocument/2006/relationships" xmlns:p1510="http://schemas.microsoft.com/office/powerpoint/2015/10/main">
   <p1510:revLst>
-    <p1510:client id="{C03F7C30-D3B4-4777-9EDF-7FD6E0ABDBDF}" v="6" dt="2022-06-17T16:48:59.876"/>
+    <p1510:client id="{ABF7B359-7FA4-4AD2-A386-0E250C73824E}" v="4" dt="2023-11-13T22:47:54.629"/>
   </p1510:revLst>
 </p1510:revInfo>
 </file>
 
 <file path=ppt/changesInfos/changesInfo1.xml><?xml version="1.0" encoding="utf-8"?>
 <pc:chgInfo xmlns:a="http://schemas.openxmlformats.org/drawingml/2006/main" xmlns:r="http://schemas.openxmlformats.org/officeDocument/2006/relationships" xmlns:ac="http://schemas.microsoft.com/office/drawing/2013/main/command" xmlns:pc="http://schemas.microsoft.com/office/powerpoint/2013/main/command">
+  <pc:docChgLst>
+    <pc:chgData name="Brian D Williamson" userId="6eaa2012-db0f-49f1-bad0-cccbf062b739" providerId="ADAL" clId="{ABF7B359-7FA4-4AD2-A386-0E250C73824E}"/>
+    <pc:docChg chg="custSel addSld modSld">
+      <pc:chgData name="Brian D Williamson" userId="6eaa2012-db0f-49f1-bad0-cccbf062b739" providerId="ADAL" clId="{ABF7B359-7FA4-4AD2-A386-0E250C73824E}" dt="2023-11-13T22:48:03.608" v="31" actId="1076"/>
+      <pc:docMkLst>
+        <pc:docMk/>
+      </pc:docMkLst>
+      <pc:sldChg chg="addSp delSp modSp new mod">
+        <pc:chgData name="Brian D Williamson" userId="6eaa2012-db0f-49f1-bad0-cccbf062b739" providerId="ADAL" clId="{ABF7B359-7FA4-4AD2-A386-0E250C73824E}" dt="2023-11-13T22:48:03.608" v="31" actId="1076"/>
+        <pc:sldMkLst>
+          <pc:docMk/>
+          <pc:sldMk cId="1121366880" sldId="259"/>
+        </pc:sldMkLst>
+        <pc:spChg chg="del">
+          <ac:chgData name="Brian D Williamson" userId="6eaa2012-db0f-49f1-bad0-cccbf062b739" providerId="ADAL" clId="{ABF7B359-7FA4-4AD2-A386-0E250C73824E}" dt="2023-11-13T22:45:56.650" v="1" actId="478"/>
+          <ac:spMkLst>
+            <pc:docMk/>
+            <pc:sldMk cId="1121366880" sldId="259"/>
+            <ac:spMk id="2" creationId="{42DF55E0-CA90-7500-24AE-B84C2999A59D}"/>
+          </ac:spMkLst>
+        </pc:spChg>
+        <pc:spChg chg="del mod">
+          <ac:chgData name="Brian D Williamson" userId="6eaa2012-db0f-49f1-bad0-cccbf062b739" providerId="ADAL" clId="{ABF7B359-7FA4-4AD2-A386-0E250C73824E}" dt="2023-11-13T22:45:59.101" v="3" actId="478"/>
+          <ac:spMkLst>
+            <pc:docMk/>
+            <pc:sldMk cId="1121366880" sldId="259"/>
+            <ac:spMk id="3" creationId="{AE77B52C-16D7-9F04-49DE-9DC1D84ED040}"/>
+          </ac:spMkLst>
+        </pc:spChg>
+        <pc:spChg chg="add mod">
+          <ac:chgData name="Brian D Williamson" userId="6eaa2012-db0f-49f1-bad0-cccbf062b739" providerId="ADAL" clId="{ABF7B359-7FA4-4AD2-A386-0E250C73824E}" dt="2023-11-13T22:46:01.252" v="4"/>
+          <ac:spMkLst>
+            <pc:docMk/>
+            <pc:sldMk cId="1121366880" sldId="259"/>
+            <ac:spMk id="5" creationId="{9FB63457-D8D7-ED79-EF08-176B5C12E2C7}"/>
+          </ac:spMkLst>
+        </pc:spChg>
+        <pc:spChg chg="add mod">
+          <ac:chgData name="Brian D Williamson" userId="6eaa2012-db0f-49f1-bad0-cccbf062b739" providerId="ADAL" clId="{ABF7B359-7FA4-4AD2-A386-0E250C73824E}" dt="2023-11-13T22:46:54.741" v="27" actId="1076"/>
+          <ac:spMkLst>
+            <pc:docMk/>
+            <pc:sldMk cId="1121366880" sldId="259"/>
+            <ac:spMk id="9" creationId="{9F5CF307-A335-7541-2378-EEBC1FA782B6}"/>
+          </ac:spMkLst>
+        </pc:spChg>
+        <pc:picChg chg="add mod">
+          <ac:chgData name="Brian D Williamson" userId="6eaa2012-db0f-49f1-bad0-cccbf062b739" providerId="ADAL" clId="{ABF7B359-7FA4-4AD2-A386-0E250C73824E}" dt="2023-11-13T22:46:01.252" v="4"/>
+          <ac:picMkLst>
+            <pc:docMk/>
+            <pc:sldMk cId="1121366880" sldId="259"/>
+            <ac:picMk id="4" creationId="{C6ABA3BD-1C3A-CB4A-F1E5-B188972EA156}"/>
+          </ac:picMkLst>
+        </pc:picChg>
+        <pc:picChg chg="add mod">
+          <ac:chgData name="Brian D Williamson" userId="6eaa2012-db0f-49f1-bad0-cccbf062b739" providerId="ADAL" clId="{ABF7B359-7FA4-4AD2-A386-0E250C73824E}" dt="2023-11-13T22:46:01.252" v="4"/>
+          <ac:picMkLst>
+            <pc:docMk/>
+            <pc:sldMk cId="1121366880" sldId="259"/>
+            <ac:picMk id="6" creationId="{7F56AA29-03C5-78F3-42AC-C5983A7BECC9}"/>
+          </ac:picMkLst>
+        </pc:picChg>
+        <pc:picChg chg="add mod">
+          <ac:chgData name="Brian D Williamson" userId="6eaa2012-db0f-49f1-bad0-cccbf062b739" providerId="ADAL" clId="{ABF7B359-7FA4-4AD2-A386-0E250C73824E}" dt="2023-11-13T22:46:39.157" v="10" actId="1076"/>
+          <ac:picMkLst>
+            <pc:docMk/>
+            <pc:sldMk cId="1121366880" sldId="259"/>
+            <ac:picMk id="8" creationId="{673F5F8B-5BCC-860B-A983-F88FC8E25A31}"/>
+          </ac:picMkLst>
+        </pc:picChg>
+        <pc:picChg chg="add mod">
+          <ac:chgData name="Brian D Williamson" userId="6eaa2012-db0f-49f1-bad0-cccbf062b739" providerId="ADAL" clId="{ABF7B359-7FA4-4AD2-A386-0E250C73824E}" dt="2023-11-13T22:48:03.608" v="31" actId="1076"/>
+          <ac:picMkLst>
+            <pc:docMk/>
+            <pc:sldMk cId="1121366880" sldId="259"/>
+            <ac:picMk id="11" creationId="{156A710C-84DC-6ABC-AF32-EBCA3460A963}"/>
+          </ac:picMkLst>
+        </pc:picChg>
+      </pc:sldChg>
+    </pc:docChg>
+  </pc:docChgLst>
   <pc:docChgLst>
     <pc:chgData name="Brian D Williamson" userId="6eaa2012-db0f-49f1-bad0-cccbf062b739" providerId="ADAL" clId="{C03F7C30-D3B4-4777-9EDF-7FD6E0ABDBDF}"/>
     <pc:docChg chg="custSel addSld modSld sldOrd">
@@ -388,7 +469,7 @@
           <a:p>
             <a:fld id="{ADD389A7-5E87-47BC-98E0-4AC123ACF3EB}" type="datetimeFigureOut">
               <a:rPr lang="en-US" smtClean="0"/>
-              <a:t>6/17/2022</a:t>
+              <a:t>11/13/2023</a:t>
             </a:fld>
             <a:endParaRPr lang="en-US"/>
           </a:p>
@@ -586,7 +667,7 @@
           <a:p>
             <a:fld id="{ADD389A7-5E87-47BC-98E0-4AC123ACF3EB}" type="datetimeFigureOut">
               <a:rPr lang="en-US" smtClean="0"/>
-              <a:t>6/17/2022</a:t>
+              <a:t>11/13/2023</a:t>
             </a:fld>
             <a:endParaRPr lang="en-US"/>
           </a:p>
@@ -794,7 +875,7 @@
           <a:p>
             <a:fld id="{ADD389A7-5E87-47BC-98E0-4AC123ACF3EB}" type="datetimeFigureOut">
               <a:rPr lang="en-US" smtClean="0"/>
-              <a:t>6/17/2022</a:t>
+              <a:t>11/13/2023</a:t>
             </a:fld>
             <a:endParaRPr lang="en-US"/>
           </a:p>
@@ -992,7 +1073,7 @@
           <a:p>
             <a:fld id="{ADD389A7-5E87-47BC-98E0-4AC123ACF3EB}" type="datetimeFigureOut">
               <a:rPr lang="en-US" smtClean="0"/>
-              <a:t>6/17/2022</a:t>
+              <a:t>11/13/2023</a:t>
             </a:fld>
             <a:endParaRPr lang="en-US"/>
           </a:p>
@@ -1267,7 +1348,7 @@
           <a:p>
             <a:fld id="{ADD389A7-5E87-47BC-98E0-4AC123ACF3EB}" type="datetimeFigureOut">
               <a:rPr lang="en-US" smtClean="0"/>
-              <a:t>6/17/2022</a:t>
+              <a:t>11/13/2023</a:t>
             </a:fld>
             <a:endParaRPr lang="en-US"/>
           </a:p>
@@ -1532,7 +1613,7 @@
           <a:p>
             <a:fld id="{ADD389A7-5E87-47BC-98E0-4AC123ACF3EB}" type="datetimeFigureOut">
               <a:rPr lang="en-US" smtClean="0"/>
-              <a:t>6/17/2022</a:t>
+              <a:t>11/13/2023</a:t>
             </a:fld>
             <a:endParaRPr lang="en-US"/>
           </a:p>
@@ -1944,7 +2025,7 @@
           <a:p>
             <a:fld id="{ADD389A7-5E87-47BC-98E0-4AC123ACF3EB}" type="datetimeFigureOut">
               <a:rPr lang="en-US" smtClean="0"/>
-              <a:t>6/17/2022</a:t>
+              <a:t>11/13/2023</a:t>
             </a:fld>
             <a:endParaRPr lang="en-US"/>
           </a:p>
@@ -2085,7 +2166,7 @@
           <a:p>
             <a:fld id="{ADD389A7-5E87-47BC-98E0-4AC123ACF3EB}" type="datetimeFigureOut">
               <a:rPr lang="en-US" smtClean="0"/>
-              <a:t>6/17/2022</a:t>
+              <a:t>11/13/2023</a:t>
             </a:fld>
             <a:endParaRPr lang="en-US"/>
           </a:p>
@@ -2198,7 +2279,7 @@
           <a:p>
             <a:fld id="{ADD389A7-5E87-47BC-98E0-4AC123ACF3EB}" type="datetimeFigureOut">
               <a:rPr lang="en-US" smtClean="0"/>
-              <a:t>6/17/2022</a:t>
+              <a:t>11/13/2023</a:t>
             </a:fld>
             <a:endParaRPr lang="en-US"/>
           </a:p>
@@ -2509,7 +2590,7 @@
           <a:p>
             <a:fld id="{ADD389A7-5E87-47BC-98E0-4AC123ACF3EB}" type="datetimeFigureOut">
               <a:rPr lang="en-US" smtClean="0"/>
-              <a:t>6/17/2022</a:t>
+              <a:t>11/13/2023</a:t>
             </a:fld>
             <a:endParaRPr lang="en-US"/>
           </a:p>
@@ -2797,7 +2878,7 @@
           <a:p>
             <a:fld id="{ADD389A7-5E87-47BC-98E0-4AC123ACF3EB}" type="datetimeFigureOut">
               <a:rPr lang="en-US" smtClean="0"/>
-              <a:t>6/17/2022</a:t>
+              <a:t>11/13/2023</a:t>
             </a:fld>
             <a:endParaRPr lang="en-US"/>
           </a:p>
@@ -3038,7 +3119,7 @@
           <a:p>
             <a:fld id="{ADD389A7-5E87-47BC-98E0-4AC123ACF3EB}" type="datetimeFigureOut">
               <a:rPr lang="en-US" smtClean="0"/>
-              <a:t>6/17/2022</a:t>
+              <a:t>11/13/2023</a:t>
             </a:fld>
             <a:endParaRPr lang="en-US"/>
           </a:p>
@@ -4204,6 +4285,250 @@
 </p:sld>
 </file>
 
+<file path=ppt/slides/slide4.xml><?xml version="1.0" encoding="utf-8"?>
+<p:sld xmlns:a="http://schemas.openxmlformats.org/drawingml/2006/main" xmlns:r="http://schemas.openxmlformats.org/officeDocument/2006/relationships" xmlns:p="http://schemas.openxmlformats.org/presentationml/2006/main">
+  <p:cSld>
+    <p:spTree>
+      <p:nvGrpSpPr>
+        <p:cNvPr id="1" name=""/>
+        <p:cNvGrpSpPr/>
+        <p:nvPr/>
+      </p:nvGrpSpPr>
+      <p:grpSpPr>
+        <a:xfrm>
+          <a:off x="0" y="0"/>
+          <a:ext cx="0" cy="0"/>
+          <a:chOff x="0" y="0"/>
+          <a:chExt cx="0" cy="0"/>
+        </a:xfrm>
+      </p:grpSpPr>
+      <p:pic>
+        <p:nvPicPr>
+          <p:cNvPr id="4" name="Picture 3" descr="A close-up of a person smiling&#10;&#10;Description automatically generated">
+            <a:extLst>
+              <a:ext uri="{FF2B5EF4-FFF2-40B4-BE49-F238E27FC236}">
+                <a16:creationId xmlns:a16="http://schemas.microsoft.com/office/drawing/2014/main" id="{C6ABA3BD-1C3A-CB4A-F1E5-B188972EA156}"/>
+              </a:ext>
+            </a:extLst>
+          </p:cNvPr>
+          <p:cNvPicPr>
+            <a:picLocks noChangeAspect="1"/>
+          </p:cNvPicPr>
+          <p:nvPr/>
+        </p:nvPicPr>
+        <p:blipFill>
+          <a:blip r:embed="rId2">
+            <a:extLst>
+              <a:ext uri="{28A0092B-C50C-407E-A947-70E740481C1C}">
+                <a14:useLocalDpi xmlns:a14="http://schemas.microsoft.com/office/drawing/2010/main" val="0"/>
+              </a:ext>
+            </a:extLst>
+          </a:blip>
+          <a:stretch>
+            <a:fillRect/>
+          </a:stretch>
+        </p:blipFill>
+        <p:spPr>
+          <a:xfrm>
+            <a:off x="2588548" y="1179427"/>
+            <a:ext cx="2436188" cy="3434431"/>
+          </a:xfrm>
+          <a:prstGeom prst="rect">
+            <a:avLst/>
+          </a:prstGeom>
+        </p:spPr>
+      </p:pic>
+      <p:sp>
+        <p:nvSpPr>
+          <p:cNvPr id="5" name="TextBox 4">
+            <a:extLst>
+              <a:ext uri="{FF2B5EF4-FFF2-40B4-BE49-F238E27FC236}">
+                <a16:creationId xmlns:a16="http://schemas.microsoft.com/office/drawing/2014/main" id="{9FB63457-D8D7-ED79-EF08-176B5C12E2C7}"/>
+              </a:ext>
+            </a:extLst>
+          </p:cNvPr>
+          <p:cNvSpPr txBox="1"/>
+          <p:nvPr/>
+        </p:nvSpPr>
+        <p:spPr>
+          <a:xfrm>
+            <a:off x="2930014" y="4768646"/>
+            <a:ext cx="1749838" cy="369332"/>
+          </a:xfrm>
+          <a:prstGeom prst="rect">
+            <a:avLst/>
+          </a:prstGeom>
+          <a:noFill/>
+        </p:spPr>
+        <p:txBody>
+          <a:bodyPr wrap="none" rtlCol="0">
+            <a:spAutoFit/>
+          </a:bodyPr>
+          <a:lstStyle/>
+          <a:p>
+            <a:r>
+              <a:rPr lang="en-US" b="1" dirty="0"/>
+              <a:t>Susan Shortreed</a:t>
+            </a:r>
+          </a:p>
+        </p:txBody>
+      </p:sp>
+      <p:pic>
+        <p:nvPicPr>
+          <p:cNvPr id="6" name="Picture 5" descr="Text&#10;&#10;Description automatically generated">
+            <a:extLst>
+              <a:ext uri="{FF2B5EF4-FFF2-40B4-BE49-F238E27FC236}">
+                <a16:creationId xmlns:a16="http://schemas.microsoft.com/office/drawing/2014/main" id="{7F56AA29-03C5-78F3-42AC-C5983A7BECC9}"/>
+              </a:ext>
+            </a:extLst>
+          </p:cNvPr>
+          <p:cNvPicPr>
+            <a:picLocks noChangeAspect="1"/>
+          </p:cNvPicPr>
+          <p:nvPr/>
+        </p:nvPicPr>
+        <p:blipFill>
+          <a:blip r:embed="rId3">
+            <a:extLst>
+              <a:ext uri="{28A0092B-C50C-407E-A947-70E740481C1C}">
+                <a14:useLocalDpi xmlns:a14="http://schemas.microsoft.com/office/drawing/2010/main" val="0"/>
+              </a:ext>
+            </a:extLst>
+          </a:blip>
+          <a:stretch>
+            <a:fillRect/>
+          </a:stretch>
+        </p:blipFill>
+        <p:spPr>
+          <a:xfrm>
+            <a:off x="2460679" y="5267024"/>
+            <a:ext cx="2688508" cy="851361"/>
+          </a:xfrm>
+          <a:prstGeom prst="rect">
+            <a:avLst/>
+          </a:prstGeom>
+        </p:spPr>
+      </p:pic>
+      <p:pic>
+        <p:nvPicPr>
+          <p:cNvPr id="8" name="Picture 7" descr="A close-up of a person smiling&#10;&#10;Description automatically generated">
+            <a:extLst>
+              <a:ext uri="{FF2B5EF4-FFF2-40B4-BE49-F238E27FC236}">
+                <a16:creationId xmlns:a16="http://schemas.microsoft.com/office/drawing/2014/main" id="{673F5F8B-5BCC-860B-A983-F88FC8E25A31}"/>
+              </a:ext>
+            </a:extLst>
+          </p:cNvPr>
+          <p:cNvPicPr>
+            <a:picLocks noChangeAspect="1"/>
+          </p:cNvPicPr>
+          <p:nvPr/>
+        </p:nvPicPr>
+        <p:blipFill>
+          <a:blip r:embed="rId4">
+            <a:extLst>
+              <a:ext uri="{28A0092B-C50C-407E-A947-70E740481C1C}">
+                <a14:useLocalDpi xmlns:a14="http://schemas.microsoft.com/office/drawing/2010/main" val="0"/>
+              </a:ext>
+            </a:extLst>
+          </a:blip>
+          <a:stretch>
+            <a:fillRect/>
+          </a:stretch>
+        </p:blipFill>
+        <p:spPr>
+          <a:xfrm>
+            <a:off x="7167266" y="1179427"/>
+            <a:ext cx="2565371" cy="2565371"/>
+          </a:xfrm>
+          <a:prstGeom prst="rect">
+            <a:avLst/>
+          </a:prstGeom>
+        </p:spPr>
+      </p:pic>
+      <p:sp>
+        <p:nvSpPr>
+          <p:cNvPr id="9" name="TextBox 8">
+            <a:extLst>
+              <a:ext uri="{FF2B5EF4-FFF2-40B4-BE49-F238E27FC236}">
+                <a16:creationId xmlns:a16="http://schemas.microsoft.com/office/drawing/2014/main" id="{9F5CF307-A335-7541-2378-EEBC1FA782B6}"/>
+              </a:ext>
+            </a:extLst>
+          </p:cNvPr>
+          <p:cNvSpPr txBox="1"/>
+          <p:nvPr/>
+        </p:nvSpPr>
+        <p:spPr>
+          <a:xfrm>
+            <a:off x="7729914" y="4768646"/>
+            <a:ext cx="1440074" cy="369332"/>
+          </a:xfrm>
+          <a:prstGeom prst="rect">
+            <a:avLst/>
+          </a:prstGeom>
+          <a:noFill/>
+        </p:spPr>
+        <p:txBody>
+          <a:bodyPr wrap="none" rtlCol="0">
+            <a:spAutoFit/>
+          </a:bodyPr>
+          <a:lstStyle/>
+          <a:p>
+            <a:r>
+              <a:rPr lang="en-US" b="1" dirty="0"/>
+              <a:t>Erica Moodie</a:t>
+            </a:r>
+          </a:p>
+        </p:txBody>
+      </p:sp>
+      <p:pic>
+        <p:nvPicPr>
+          <p:cNvPr id="11" name="Picture 10" descr="A close-up of a sign&#10;&#10;Description automatically generated">
+            <a:extLst>
+              <a:ext uri="{FF2B5EF4-FFF2-40B4-BE49-F238E27FC236}">
+                <a16:creationId xmlns:a16="http://schemas.microsoft.com/office/drawing/2014/main" id="{156A710C-84DC-6ABC-AF32-EBCA3460A963}"/>
+              </a:ext>
+            </a:extLst>
+          </p:cNvPr>
+          <p:cNvPicPr>
+            <a:picLocks noChangeAspect="1"/>
+          </p:cNvPicPr>
+          <p:nvPr/>
+        </p:nvPicPr>
+        <p:blipFill>
+          <a:blip r:embed="rId5">
+            <a:extLst>
+              <a:ext uri="{28A0092B-C50C-407E-A947-70E740481C1C}">
+                <a14:useLocalDpi xmlns:a14="http://schemas.microsoft.com/office/drawing/2010/main" val="0"/>
+              </a:ext>
+            </a:extLst>
+          </a:blip>
+          <a:stretch>
+            <a:fillRect/>
+          </a:stretch>
+        </p:blipFill>
+        <p:spPr>
+          <a:xfrm>
+            <a:off x="6096000" y="5267024"/>
+            <a:ext cx="5372850" cy="924054"/>
+          </a:xfrm>
+          <a:prstGeom prst="rect">
+            <a:avLst/>
+          </a:prstGeom>
+        </p:spPr>
+      </p:pic>
+    </p:spTree>
+    <p:extLst>
+      <p:ext uri="{BB962C8B-B14F-4D97-AF65-F5344CB8AC3E}">
+        <p14:creationId xmlns:p14="http://schemas.microsoft.com/office/powerpoint/2010/main" val="1121366880"/>
+      </p:ext>
+    </p:extLst>
+  </p:cSld>
+  <p:clrMapOvr>
+    <a:masterClrMapping/>
+  </p:clrMapOvr>
+</p:sld>
+</file>
+
 <file path=ppt/theme/theme1.xml><?xml version="1.0" encoding="utf-8"?>
 <a:theme xmlns:a="http://schemas.openxmlformats.org/drawingml/2006/main" name="Office Theme">
   <a:themeElements>

</xml_diff>